<commit_message>
working base pip includin yolo8 pretrain
</commit_message>
<xml_diff>
--- a/video_change_detection.pptx
+++ b/video_change_detection.pptx
@@ -265,7 +265,7 @@
           <a:p>
             <a:fld id="{0F1AD3A2-3400-4E7C-BDCC-3930B391FA0B}" type="datetimeFigureOut">
               <a:rPr lang="he-IL" smtClean="0"/>
-              <a:t>ל'/חשון/תשפ"ה</a:t>
+              <a:t>ד'/כסלו/תשפ"ה</a:t>
             </a:fld>
             <a:endParaRPr lang="he-IL"/>
           </a:p>
@@ -465,7 +465,7 @@
           <a:p>
             <a:fld id="{0F1AD3A2-3400-4E7C-BDCC-3930B391FA0B}" type="datetimeFigureOut">
               <a:rPr lang="he-IL" smtClean="0"/>
-              <a:t>ל'/חשון/תשפ"ה</a:t>
+              <a:t>ד'/כסלו/תשפ"ה</a:t>
             </a:fld>
             <a:endParaRPr lang="he-IL"/>
           </a:p>
@@ -675,7 +675,7 @@
           <a:p>
             <a:fld id="{0F1AD3A2-3400-4E7C-BDCC-3930B391FA0B}" type="datetimeFigureOut">
               <a:rPr lang="he-IL" smtClean="0"/>
-              <a:t>ל'/חשון/תשפ"ה</a:t>
+              <a:t>ד'/כסלו/תשפ"ה</a:t>
             </a:fld>
             <a:endParaRPr lang="he-IL"/>
           </a:p>
@@ -875,7 +875,7 @@
           <a:p>
             <a:fld id="{0F1AD3A2-3400-4E7C-BDCC-3930B391FA0B}" type="datetimeFigureOut">
               <a:rPr lang="he-IL" smtClean="0"/>
-              <a:t>ל'/חשון/תשפ"ה</a:t>
+              <a:t>ד'/כסלו/תשפ"ה</a:t>
             </a:fld>
             <a:endParaRPr lang="he-IL"/>
           </a:p>
@@ -1151,7 +1151,7 @@
           <a:p>
             <a:fld id="{0F1AD3A2-3400-4E7C-BDCC-3930B391FA0B}" type="datetimeFigureOut">
               <a:rPr lang="he-IL" smtClean="0"/>
-              <a:t>ל'/חשון/תשפ"ה</a:t>
+              <a:t>ד'/כסלו/תשפ"ה</a:t>
             </a:fld>
             <a:endParaRPr lang="he-IL"/>
           </a:p>
@@ -1419,7 +1419,7 @@
           <a:p>
             <a:fld id="{0F1AD3A2-3400-4E7C-BDCC-3930B391FA0B}" type="datetimeFigureOut">
               <a:rPr lang="he-IL" smtClean="0"/>
-              <a:t>ל'/חשון/תשפ"ה</a:t>
+              <a:t>ד'/כסלו/תשפ"ה</a:t>
             </a:fld>
             <a:endParaRPr lang="he-IL"/>
           </a:p>
@@ -1834,7 +1834,7 @@
           <a:p>
             <a:fld id="{0F1AD3A2-3400-4E7C-BDCC-3930B391FA0B}" type="datetimeFigureOut">
               <a:rPr lang="he-IL" smtClean="0"/>
-              <a:t>ל'/חשון/תשפ"ה</a:t>
+              <a:t>ד'/כסלו/תשפ"ה</a:t>
             </a:fld>
             <a:endParaRPr lang="he-IL"/>
           </a:p>
@@ -1976,7 +1976,7 @@
           <a:p>
             <a:fld id="{0F1AD3A2-3400-4E7C-BDCC-3930B391FA0B}" type="datetimeFigureOut">
               <a:rPr lang="he-IL" smtClean="0"/>
-              <a:t>ל'/חשון/תשפ"ה</a:t>
+              <a:t>ד'/כסלו/תשפ"ה</a:t>
             </a:fld>
             <a:endParaRPr lang="he-IL"/>
           </a:p>
@@ -2089,7 +2089,7 @@
           <a:p>
             <a:fld id="{0F1AD3A2-3400-4E7C-BDCC-3930B391FA0B}" type="datetimeFigureOut">
               <a:rPr lang="he-IL" smtClean="0"/>
-              <a:t>ל'/חשון/תשפ"ה</a:t>
+              <a:t>ד'/כסלו/תשפ"ה</a:t>
             </a:fld>
             <a:endParaRPr lang="he-IL"/>
           </a:p>
@@ -2402,7 +2402,7 @@
           <a:p>
             <a:fld id="{0F1AD3A2-3400-4E7C-BDCC-3930B391FA0B}" type="datetimeFigureOut">
               <a:rPr lang="he-IL" smtClean="0"/>
-              <a:t>ל'/חשון/תשפ"ה</a:t>
+              <a:t>ד'/כסלו/תשפ"ה</a:t>
             </a:fld>
             <a:endParaRPr lang="he-IL"/>
           </a:p>
@@ -2691,7 +2691,7 @@
           <a:p>
             <a:fld id="{0F1AD3A2-3400-4E7C-BDCC-3930B391FA0B}" type="datetimeFigureOut">
               <a:rPr lang="he-IL" smtClean="0"/>
-              <a:t>ל'/חשון/תשפ"ה</a:t>
+              <a:t>ד'/כסלו/תשפ"ה</a:t>
             </a:fld>
             <a:endParaRPr lang="he-IL"/>
           </a:p>
@@ -2934,7 +2934,7 @@
           <a:p>
             <a:fld id="{0F1AD3A2-3400-4E7C-BDCC-3930B391FA0B}" type="datetimeFigureOut">
               <a:rPr lang="he-IL" smtClean="0"/>
-              <a:t>ל'/חשון/תשפ"ה</a:t>
+              <a:t>ד'/כסלו/תשפ"ה</a:t>
             </a:fld>
             <a:endParaRPr lang="he-IL"/>
           </a:p>
@@ -3803,7 +3803,7 @@
             <a:pPr lvl="2"/>
             <a:r>
               <a:rPr lang="en-US" dirty="0"/>
-              <a:t>use consecutive frame</a:t>
+              <a:t>Use consecutive frame as baseline model for comparison</a:t>
             </a:r>
           </a:p>
           <a:p>
@@ -3816,6 +3816,13 @@
           <a:p>
             <a:pPr lvl="2"/>
             <a:r>
+              <a:rPr lang="en-US"/>
+              <a:t>Optical flow </a:t>
+            </a:r>
+          </a:p>
+          <a:p>
+            <a:pPr lvl="2"/>
+            <a:r>
               <a:rPr lang="en-US" dirty="0"/>
               <a:t>Subtract background baseline model from each frame</a:t>
             </a:r>
@@ -3825,13 +3832,6 @@
             <a:r>
               <a:rPr lang="en-US" dirty="0"/>
               <a:t>Structural similarity index (SSI)</a:t>
-            </a:r>
-          </a:p>
-          <a:p>
-            <a:pPr lvl="2"/>
-            <a:r>
-              <a:rPr lang="en-US" dirty="0"/>
-              <a:t>Optical flow </a:t>
             </a:r>
           </a:p>
         </p:txBody>

</xml_diff>

<commit_message>
added deep + background
</commit_message>
<xml_diff>
--- a/video_change_detection.pptx
+++ b/video_change_detection.pptx
@@ -265,7 +265,7 @@
           <a:p>
             <a:fld id="{0F1AD3A2-3400-4E7C-BDCC-3930B391FA0B}" type="datetimeFigureOut">
               <a:rPr lang="he-IL" smtClean="0"/>
-              <a:t>ד'/כסלו/תשפ"ה</a:t>
+              <a:t>כ"ה/כסלו/תשפ"ה</a:t>
             </a:fld>
             <a:endParaRPr lang="he-IL"/>
           </a:p>
@@ -465,7 +465,7 @@
           <a:p>
             <a:fld id="{0F1AD3A2-3400-4E7C-BDCC-3930B391FA0B}" type="datetimeFigureOut">
               <a:rPr lang="he-IL" smtClean="0"/>
-              <a:t>ד'/כסלו/תשפ"ה</a:t>
+              <a:t>כ"ה/כסלו/תשפ"ה</a:t>
             </a:fld>
             <a:endParaRPr lang="he-IL"/>
           </a:p>
@@ -675,7 +675,7 @@
           <a:p>
             <a:fld id="{0F1AD3A2-3400-4E7C-BDCC-3930B391FA0B}" type="datetimeFigureOut">
               <a:rPr lang="he-IL" smtClean="0"/>
-              <a:t>ד'/כסלו/תשפ"ה</a:t>
+              <a:t>כ"ה/כסלו/תשפ"ה</a:t>
             </a:fld>
             <a:endParaRPr lang="he-IL"/>
           </a:p>
@@ -875,7 +875,7 @@
           <a:p>
             <a:fld id="{0F1AD3A2-3400-4E7C-BDCC-3930B391FA0B}" type="datetimeFigureOut">
               <a:rPr lang="he-IL" smtClean="0"/>
-              <a:t>ד'/כסלו/תשפ"ה</a:t>
+              <a:t>כ"ה/כסלו/תשפ"ה</a:t>
             </a:fld>
             <a:endParaRPr lang="he-IL"/>
           </a:p>
@@ -1151,7 +1151,7 @@
           <a:p>
             <a:fld id="{0F1AD3A2-3400-4E7C-BDCC-3930B391FA0B}" type="datetimeFigureOut">
               <a:rPr lang="he-IL" smtClean="0"/>
-              <a:t>ד'/כסלו/תשפ"ה</a:t>
+              <a:t>כ"ה/כסלו/תשפ"ה</a:t>
             </a:fld>
             <a:endParaRPr lang="he-IL"/>
           </a:p>
@@ -1419,7 +1419,7 @@
           <a:p>
             <a:fld id="{0F1AD3A2-3400-4E7C-BDCC-3930B391FA0B}" type="datetimeFigureOut">
               <a:rPr lang="he-IL" smtClean="0"/>
-              <a:t>ד'/כסלו/תשפ"ה</a:t>
+              <a:t>כ"ה/כסלו/תשפ"ה</a:t>
             </a:fld>
             <a:endParaRPr lang="he-IL"/>
           </a:p>
@@ -1834,7 +1834,7 @@
           <a:p>
             <a:fld id="{0F1AD3A2-3400-4E7C-BDCC-3930B391FA0B}" type="datetimeFigureOut">
               <a:rPr lang="he-IL" smtClean="0"/>
-              <a:t>ד'/כסלו/תשפ"ה</a:t>
+              <a:t>כ"ה/כסלו/תשפ"ה</a:t>
             </a:fld>
             <a:endParaRPr lang="he-IL"/>
           </a:p>
@@ -1976,7 +1976,7 @@
           <a:p>
             <a:fld id="{0F1AD3A2-3400-4E7C-BDCC-3930B391FA0B}" type="datetimeFigureOut">
               <a:rPr lang="he-IL" smtClean="0"/>
-              <a:t>ד'/כסלו/תשפ"ה</a:t>
+              <a:t>כ"ה/כסלו/תשפ"ה</a:t>
             </a:fld>
             <a:endParaRPr lang="he-IL"/>
           </a:p>
@@ -2089,7 +2089,7 @@
           <a:p>
             <a:fld id="{0F1AD3A2-3400-4E7C-BDCC-3930B391FA0B}" type="datetimeFigureOut">
               <a:rPr lang="he-IL" smtClean="0"/>
-              <a:t>ד'/כסלו/תשפ"ה</a:t>
+              <a:t>כ"ה/כסלו/תשפ"ה</a:t>
             </a:fld>
             <a:endParaRPr lang="he-IL"/>
           </a:p>
@@ -2402,7 +2402,7 @@
           <a:p>
             <a:fld id="{0F1AD3A2-3400-4E7C-BDCC-3930B391FA0B}" type="datetimeFigureOut">
               <a:rPr lang="he-IL" smtClean="0"/>
-              <a:t>ד'/כסלו/תשפ"ה</a:t>
+              <a:t>כ"ה/כסלו/תשפ"ה</a:t>
             </a:fld>
             <a:endParaRPr lang="he-IL"/>
           </a:p>
@@ -2691,7 +2691,7 @@
           <a:p>
             <a:fld id="{0F1AD3A2-3400-4E7C-BDCC-3930B391FA0B}" type="datetimeFigureOut">
               <a:rPr lang="he-IL" smtClean="0"/>
-              <a:t>ד'/כסלו/תשפ"ה</a:t>
+              <a:t>כ"ה/כסלו/תשפ"ה</a:t>
             </a:fld>
             <a:endParaRPr lang="he-IL"/>
           </a:p>
@@ -2934,7 +2934,7 @@
           <a:p>
             <a:fld id="{0F1AD3A2-3400-4E7C-BDCC-3930B391FA0B}" type="datetimeFigureOut">
               <a:rPr lang="he-IL" smtClean="0"/>
-              <a:t>ד'/כסלו/תשפ"ה</a:t>
+              <a:t>כ"ה/כסלו/תשפ"ה</a:t>
             </a:fld>
             <a:endParaRPr lang="he-IL"/>
           </a:p>
@@ -3762,77 +3762,148 @@
         </p:nvSpPr>
         <p:spPr/>
         <p:txBody>
-          <a:bodyPr/>
-          <a:lstStyle/>
-          <a:p>
-            <a:r>
-              <a:rPr lang="en-US" dirty="0"/>
-              <a:t>Background subtraction</a:t>
-            </a:r>
-          </a:p>
-          <a:p>
-            <a:pPr lvl="1"/>
+          <a:bodyPr>
+            <a:normAutofit fontScale="92500" lnSpcReduction="10000"/>
+          </a:bodyPr>
+          <a:lstStyle/>
+          <a:p>
+            <a:pPr marL="0" indent="0">
+              <a:buNone/>
+            </a:pPr>
+            <a:r>
+              <a:rPr lang="en-US" dirty="0"/>
+              <a:t>Background subtraction from video scene</a:t>
+            </a:r>
+          </a:p>
+          <a:p>
+            <a:pPr marL="914400" lvl="1" indent="-457200">
+              <a:buFont typeface="+mj-lt"/>
+              <a:buAutoNum type="arabicPeriod"/>
+            </a:pPr>
             <a:r>
               <a:rPr lang="en-US" dirty="0"/>
               <a:t>Initialize background baseline model for comparison</a:t>
             </a:r>
           </a:p>
           <a:p>
-            <a:pPr lvl="2"/>
-            <a:r>
-              <a:rPr lang="en-US" dirty="0"/>
-              <a:t>Gaussian mixture models (</a:t>
+            <a:pPr marL="1371600" lvl="2" indent="-457200">
+              <a:buFont typeface="+mj-lt"/>
+              <a:buAutoNum type="arabicPeriod"/>
+            </a:pPr>
+            <a:r>
+              <a:rPr lang="en-US" dirty="0"/>
+              <a:t>Use consecutive frame as baseline model for comparison</a:t>
+            </a:r>
+          </a:p>
+          <a:p>
+            <a:pPr marL="1371600" lvl="2" indent="-457200">
+              <a:buFont typeface="+mj-lt"/>
+              <a:buAutoNum type="arabicPeriod"/>
+            </a:pPr>
+            <a:r>
+              <a:rPr lang="en-US" dirty="0"/>
+              <a:t>Running average</a:t>
+            </a:r>
+          </a:p>
+          <a:p>
+            <a:pPr marL="1371600" lvl="2" indent="-457200">
+              <a:buFont typeface="+mj-lt"/>
+              <a:buAutoNum type="arabicPeriod"/>
+            </a:pPr>
+            <a:r>
+              <a:rPr lang="en-US" dirty="0"/>
+              <a:t>Background Subtractors (Mixture of Gaussians, KNN, SVD, Count etc.)</a:t>
+            </a:r>
+          </a:p>
+          <a:p>
+            <a:pPr marL="1371600" lvl="2" indent="-457200">
+              <a:buFont typeface="+mj-lt"/>
+              <a:buAutoNum type="arabicPeriod"/>
+            </a:pPr>
+            <a:r>
+              <a:rPr lang="en-US" dirty="0"/>
+              <a:t>Hybrid; Mixture of Gaussians (MOG2) with a deep learning-based pre-trained segmentation model (U-Net, Mask R-CNN) for improved accuracy.</a:t>
+            </a:r>
+            <a:endParaRPr lang="en-US" sz="2000" dirty="0"/>
+          </a:p>
+          <a:p>
+            <a:pPr marL="1371600" lvl="2" indent="-457200">
+              <a:buFont typeface="+mj-lt"/>
+              <a:buAutoNum type="arabicPeriod"/>
+            </a:pPr>
+            <a:endParaRPr lang="en-US" dirty="0"/>
+          </a:p>
+          <a:p>
+            <a:pPr marL="914400" lvl="1" indent="-457200">
+              <a:buFont typeface="+mj-lt"/>
+              <a:buAutoNum type="arabicPeriod"/>
+            </a:pPr>
+            <a:r>
+              <a:rPr lang="en-US" dirty="0"/>
+              <a:t>Identify changes and their ROI (subtract background baseline from frames)</a:t>
+            </a:r>
+          </a:p>
+          <a:p>
+            <a:pPr marL="1371600" lvl="2" indent="-457200">
+              <a:buFont typeface="+mj-lt"/>
+              <a:buAutoNum type="arabicPeriod"/>
+            </a:pPr>
+            <a:r>
+              <a:rPr lang="en-US" dirty="0"/>
+              <a:t>Background Subtraction</a:t>
+            </a:r>
+          </a:p>
+          <a:p>
+            <a:pPr marL="1371600" lvl="2" indent="-457200">
+              <a:buFont typeface="+mj-lt"/>
+              <a:buAutoNum type="arabicPeriod"/>
+            </a:pPr>
+            <a:r>
+              <a:rPr lang="en-US" dirty="0"/>
+              <a:t>Optical flow (</a:t>
             </a:r>
             <a:r>
               <a:rPr lang="en-US" dirty="0" err="1"/>
-              <a:t>gmm</a:t>
-            </a:r>
-            <a:r>
-              <a:rPr lang="en-US" dirty="0"/>
-              <a:t>)</a:t>
-            </a:r>
-          </a:p>
-          <a:p>
-            <a:pPr lvl="2"/>
-            <a:r>
-              <a:rPr lang="en-US" dirty="0"/>
-              <a:t>Running average</a:t>
-            </a:r>
-          </a:p>
-          <a:p>
-            <a:pPr lvl="2"/>
-            <a:r>
-              <a:rPr lang="en-US" dirty="0"/>
-              <a:t>Use consecutive frame as baseline model for comparison</a:t>
-            </a:r>
-          </a:p>
-          <a:p>
-            <a:pPr marL="800100" lvl="1" indent="-342900"/>
-            <a:r>
-              <a:rPr lang="en-US" dirty="0"/>
-              <a:t>Detect if there is change and where</a:t>
-            </a:r>
-          </a:p>
-          <a:p>
-            <a:pPr lvl="2"/>
-            <a:r>
-              <a:rPr lang="en-US"/>
-              <a:t>Optical flow </a:t>
-            </a:r>
-          </a:p>
-          <a:p>
-            <a:pPr lvl="2"/>
-            <a:r>
-              <a:rPr lang="en-US" dirty="0"/>
-              <a:t>Subtract background baseline model from each frame</a:t>
-            </a:r>
-          </a:p>
-          <a:p>
-            <a:pPr lvl="2"/>
-            <a:r>
-              <a:rPr lang="en-US" dirty="0"/>
-              <a:t>Structural similarity index (SSI)</a:t>
-            </a:r>
+              <a:t>Farneback</a:t>
+            </a:r>
+            <a:r>
+              <a:rPr lang="en-US" dirty="0"/>
+              <a:t> Optical Flow or Lucas-</a:t>
+            </a:r>
+            <a:r>
+              <a:rPr lang="en-US" dirty="0" err="1"/>
+              <a:t>Kanade</a:t>
+            </a:r>
+            <a:r>
+              <a:rPr lang="en-US" dirty="0"/>
+              <a:t> Optical Flow)</a:t>
+            </a:r>
+          </a:p>
+          <a:p>
+            <a:pPr marL="1371600" lvl="2" indent="-457200">
+              <a:buFont typeface="+mj-lt"/>
+              <a:buAutoNum type="arabicPeriod"/>
+            </a:pPr>
+            <a:r>
+              <a:rPr lang="en-US" dirty="0"/>
+              <a:t>Integrate Optical Flow with Structural Similarity Index (SSI) to balance motion tracking and structural analysis.</a:t>
+            </a:r>
+          </a:p>
+          <a:p>
+            <a:pPr marL="1371600" lvl="2" indent="-457200">
+              <a:buFont typeface="+mj-lt"/>
+              <a:buAutoNum type="arabicPeriod"/>
+            </a:pPr>
+            <a:r>
+              <a:rPr lang="en-US" dirty="0"/>
+              <a:t>Saliency Detection: Identify prominent regions of change based on attention mechanisms.</a:t>
+            </a:r>
+          </a:p>
+          <a:p>
+            <a:pPr marL="914400" lvl="2" indent="0">
+              <a:buNone/>
+            </a:pPr>
+            <a:endParaRPr lang="en-US" dirty="0"/>
           </a:p>
         </p:txBody>
       </p:sp>

</xml_diff>